<commit_message>
Poster Cleaning and Updates
</commit_message>
<xml_diff>
--- a/assets/CSHL_PPT_Poster_V2.pptx
+++ b/assets/CSHL_PPT_Poster_V2.pptx
@@ -115,10 +115,262 @@
 <file path=ppt/revisionInfo.xml><?xml version="1.0" encoding="utf-8"?>
 <p1510:revInfo xmlns:a="http://schemas.openxmlformats.org/drawingml/2006/main" xmlns:r="http://schemas.openxmlformats.org/officeDocument/2006/relationships" xmlns:p1510="http://schemas.microsoft.com/office/powerpoint/2015/10/main">
   <p1510:revLst>
-    <p1510:client id="{5AE76646-08D4-464D-814A-33706E6B22BC}" v="767" dt="2024-10-08T21:09:17.281"/>
-    <p1510:client id="{74D3705F-D23E-574A-81CD-1A9C45B3E2A9}" v="25" dt="2024-10-09T19:06:13.956"/>
+    <p1510:client id="{0C402FB5-1208-C94F-B091-6134B46BEC84}" v="18" dt="2024-10-10T21:56:04.701"/>
   </p1510:revLst>
 </p1510:revInfo>
+</file>
+
+<file path=ppt/changesInfos/changesInfo1.xml><?xml version="1.0" encoding="utf-8"?>
+<pc:chgInfo xmlns:a="http://schemas.openxmlformats.org/drawingml/2006/main" xmlns:r="http://schemas.openxmlformats.org/officeDocument/2006/relationships" xmlns:ac="http://schemas.microsoft.com/office/drawing/2013/main/command" xmlns:pc="http://schemas.microsoft.com/office/powerpoint/2013/main/command">
+  <pc:docChgLst>
+    <pc:chgData name="McCauley, Kathryn (NIH/NIAID) [C]" userId="8123e298-eaa7-4067-960e-8e9acda1581f" providerId="ADAL" clId="{0C402FB5-1208-C94F-B091-6134B46BEC84}"/>
+    <pc:docChg chg="undo custSel modSld">
+      <pc:chgData name="McCauley, Kathryn (NIH/NIAID) [C]" userId="8123e298-eaa7-4067-960e-8e9acda1581f" providerId="ADAL" clId="{0C402FB5-1208-C94F-B091-6134B46BEC84}" dt="2024-10-10T21:59:03.342" v="1174" actId="20577"/>
+      <pc:docMkLst>
+        <pc:docMk/>
+      </pc:docMkLst>
+      <pc:sldChg chg="addSp modSp mod">
+        <pc:chgData name="McCauley, Kathryn (NIH/NIAID) [C]" userId="8123e298-eaa7-4067-960e-8e9acda1581f" providerId="ADAL" clId="{0C402FB5-1208-C94F-B091-6134B46BEC84}" dt="2024-10-10T21:59:03.342" v="1174" actId="20577"/>
+        <pc:sldMkLst>
+          <pc:docMk/>
+          <pc:sldMk cId="1538252808" sldId="257"/>
+        </pc:sldMkLst>
+        <pc:spChg chg="add mod">
+          <ac:chgData name="McCauley, Kathryn (NIH/NIAID) [C]" userId="8123e298-eaa7-4067-960e-8e9acda1581f" providerId="ADAL" clId="{0C402FB5-1208-C94F-B091-6134B46BEC84}" dt="2024-10-10T21:43:21.070" v="526" actId="20577"/>
+          <ac:spMkLst>
+            <pc:docMk/>
+            <pc:sldMk cId="1538252808" sldId="257"/>
+            <ac:spMk id="3" creationId="{2F1BB749-BE6B-7121-DDEC-86CBB96B86A4}"/>
+          </ac:spMkLst>
+        </pc:spChg>
+        <pc:spChg chg="mod">
+          <ac:chgData name="McCauley, Kathryn (NIH/NIAID) [C]" userId="8123e298-eaa7-4067-960e-8e9acda1581f" providerId="ADAL" clId="{0C402FB5-1208-C94F-B091-6134B46BEC84}" dt="2024-10-10T21:08:09.377" v="13" actId="20577"/>
+          <ac:spMkLst>
+            <pc:docMk/>
+            <pc:sldMk cId="1538252808" sldId="257"/>
+            <ac:spMk id="5" creationId="{F05E9AA4-4C73-6C18-EA6F-DED383352859}"/>
+          </ac:spMkLst>
+        </pc:spChg>
+        <pc:spChg chg="add mod">
+          <ac:chgData name="McCauley, Kathryn (NIH/NIAID) [C]" userId="8123e298-eaa7-4067-960e-8e9acda1581f" providerId="ADAL" clId="{0C402FB5-1208-C94F-B091-6134B46BEC84}" dt="2024-10-10T21:45:58.435" v="763" actId="1038"/>
+          <ac:spMkLst>
+            <pc:docMk/>
+            <pc:sldMk cId="1538252808" sldId="257"/>
+            <ac:spMk id="10" creationId="{3FF8500E-F020-B67B-B2EC-6E060C812A30}"/>
+          </ac:spMkLst>
+        </pc:spChg>
+        <pc:spChg chg="mod">
+          <ac:chgData name="McCauley, Kathryn (NIH/NIAID) [C]" userId="8123e298-eaa7-4067-960e-8e9acda1581f" providerId="ADAL" clId="{0C402FB5-1208-C94F-B091-6134B46BEC84}" dt="2024-10-10T21:59:03.342" v="1174" actId="20577"/>
+          <ac:spMkLst>
+            <pc:docMk/>
+            <pc:sldMk cId="1538252808" sldId="257"/>
+            <ac:spMk id="13" creationId="{12DE2103-9056-398D-06A1-53754FA9056A}"/>
+          </ac:spMkLst>
+        </pc:spChg>
+        <pc:spChg chg="mod">
+          <ac:chgData name="McCauley, Kathryn (NIH/NIAID) [C]" userId="8123e298-eaa7-4067-960e-8e9acda1581f" providerId="ADAL" clId="{0C402FB5-1208-C94F-B091-6134B46BEC84}" dt="2024-10-10T21:44:20.067" v="727" actId="20577"/>
+          <ac:spMkLst>
+            <pc:docMk/>
+            <pc:sldMk cId="1538252808" sldId="257"/>
+            <ac:spMk id="22" creationId="{E78A71C4-F697-E1B8-179F-12202F810773}"/>
+          </ac:spMkLst>
+        </pc:spChg>
+        <pc:spChg chg="add mod">
+          <ac:chgData name="McCauley, Kathryn (NIH/NIAID) [C]" userId="8123e298-eaa7-4067-960e-8e9acda1581f" providerId="ADAL" clId="{0C402FB5-1208-C94F-B091-6134B46BEC84}" dt="2024-10-10T21:46:05.301" v="764" actId="14100"/>
+          <ac:spMkLst>
+            <pc:docMk/>
+            <pc:sldMk cId="1538252808" sldId="257"/>
+            <ac:spMk id="33" creationId="{C7A041FC-2FE3-CE2D-62AA-8623BDF14518}"/>
+          </ac:spMkLst>
+        </pc:spChg>
+        <pc:spChg chg="add mod">
+          <ac:chgData name="McCauley, Kathryn (NIH/NIAID) [C]" userId="8123e298-eaa7-4067-960e-8e9acda1581f" providerId="ADAL" clId="{0C402FB5-1208-C94F-B091-6134B46BEC84}" dt="2024-10-10T21:46:19.843" v="772" actId="1035"/>
+          <ac:spMkLst>
+            <pc:docMk/>
+            <pc:sldMk cId="1538252808" sldId="257"/>
+            <ac:spMk id="34" creationId="{6323F439-FCC2-49B2-CFD7-A85F32D5A215}"/>
+          </ac:spMkLst>
+        </pc:spChg>
+        <pc:spChg chg="mod">
+          <ac:chgData name="McCauley, Kathryn (NIH/NIAID) [C]" userId="8123e298-eaa7-4067-960e-8e9acda1581f" providerId="ADAL" clId="{0C402FB5-1208-C94F-B091-6134B46BEC84}" dt="2024-10-10T21:18:59.036" v="48" actId="1035"/>
+          <ac:spMkLst>
+            <pc:docMk/>
+            <pc:sldMk cId="1538252808" sldId="257"/>
+            <ac:spMk id="36" creationId="{76E20482-2063-F529-A2BF-8427E2412B0A}"/>
+          </ac:spMkLst>
+        </pc:spChg>
+        <pc:spChg chg="add mod">
+          <ac:chgData name="McCauley, Kathryn (NIH/NIAID) [C]" userId="8123e298-eaa7-4067-960e-8e9acda1581f" providerId="ADAL" clId="{0C402FB5-1208-C94F-B091-6134B46BEC84}" dt="2024-10-10T21:46:30.307" v="774" actId="1076"/>
+          <ac:spMkLst>
+            <pc:docMk/>
+            <pc:sldMk cId="1538252808" sldId="257"/>
+            <ac:spMk id="38" creationId="{77A4B0E6-B56D-0044-B34A-AC97ED2A9663}"/>
+          </ac:spMkLst>
+        </pc:spChg>
+        <pc:spChg chg="add mod">
+          <ac:chgData name="McCauley, Kathryn (NIH/NIAID) [C]" userId="8123e298-eaa7-4067-960e-8e9acda1581f" providerId="ADAL" clId="{0C402FB5-1208-C94F-B091-6134B46BEC84}" dt="2024-10-10T21:46:40.577" v="776" actId="1076"/>
+          <ac:spMkLst>
+            <pc:docMk/>
+            <pc:sldMk cId="1538252808" sldId="257"/>
+            <ac:spMk id="39" creationId="{C0C8D7DD-FCDF-51E8-1DC6-86BAB9D025FA}"/>
+          </ac:spMkLst>
+        </pc:spChg>
+        <pc:spChg chg="mod">
+          <ac:chgData name="McCauley, Kathryn (NIH/NIAID) [C]" userId="8123e298-eaa7-4067-960e-8e9acda1581f" providerId="ADAL" clId="{0C402FB5-1208-C94F-B091-6134B46BEC84}" dt="2024-10-10T21:44:26.241" v="742" actId="1035"/>
+          <ac:spMkLst>
+            <pc:docMk/>
+            <pc:sldMk cId="1538252808" sldId="257"/>
+            <ac:spMk id="46" creationId="{1F5AA803-EB7B-4D90-1F1E-4CE8BA1AA2ED}"/>
+          </ac:spMkLst>
+        </pc:spChg>
+        <pc:spChg chg="add mod">
+          <ac:chgData name="McCauley, Kathryn (NIH/NIAID) [C]" userId="8123e298-eaa7-4067-960e-8e9acda1581f" providerId="ADAL" clId="{0C402FB5-1208-C94F-B091-6134B46BEC84}" dt="2024-10-10T21:46:47.761" v="783" actId="1038"/>
+          <ac:spMkLst>
+            <pc:docMk/>
+            <pc:sldMk cId="1538252808" sldId="257"/>
+            <ac:spMk id="1027" creationId="{6D84AA70-7A19-5F38-4C65-59C97ECD91C2}"/>
+          </ac:spMkLst>
+        </pc:spChg>
+        <pc:spChg chg="mod">
+          <ac:chgData name="McCauley, Kathryn (NIH/NIAID) [C]" userId="8123e298-eaa7-4067-960e-8e9acda1581f" providerId="ADAL" clId="{0C402FB5-1208-C94F-B091-6134B46BEC84}" dt="2024-10-10T21:24:23.539" v="62" actId="1037"/>
+          <ac:spMkLst>
+            <pc:docMk/>
+            <pc:sldMk cId="1538252808" sldId="257"/>
+            <ac:spMk id="1030" creationId="{04C874F6-88B8-AEC9-0831-AE90BD572DB4}"/>
+          </ac:spMkLst>
+        </pc:spChg>
+        <pc:spChg chg="add mod">
+          <ac:chgData name="McCauley, Kathryn (NIH/NIAID) [C]" userId="8123e298-eaa7-4067-960e-8e9acda1581f" providerId="ADAL" clId="{0C402FB5-1208-C94F-B091-6134B46BEC84}" dt="2024-10-10T21:47:08.680" v="804" actId="1038"/>
+          <ac:spMkLst>
+            <pc:docMk/>
+            <pc:sldMk cId="1538252808" sldId="257"/>
+            <ac:spMk id="1048" creationId="{3EB4E4F8-EFCF-08A2-E73C-39653C392458}"/>
+          </ac:spMkLst>
+        </pc:spChg>
+        <pc:spChg chg="add mod">
+          <ac:chgData name="McCauley, Kathryn (NIH/NIAID) [C]" userId="8123e298-eaa7-4067-960e-8e9acda1581f" providerId="ADAL" clId="{0C402FB5-1208-C94F-B091-6134B46BEC84}" dt="2024-10-10T21:47:22.929" v="812" actId="1035"/>
+          <ac:spMkLst>
+            <pc:docMk/>
+            <pc:sldMk cId="1538252808" sldId="257"/>
+            <ac:spMk id="1050" creationId="{D9B59387-48BA-F9E3-44E2-7AE6D32AF625}"/>
+          </ac:spMkLst>
+        </pc:spChg>
+        <pc:spChg chg="add mod">
+          <ac:chgData name="McCauley, Kathryn (NIH/NIAID) [C]" userId="8123e298-eaa7-4067-960e-8e9acda1581f" providerId="ADAL" clId="{0C402FB5-1208-C94F-B091-6134B46BEC84}" dt="2024-10-10T21:47:55.823" v="819" actId="1037"/>
+          <ac:spMkLst>
+            <pc:docMk/>
+            <pc:sldMk cId="1538252808" sldId="257"/>
+            <ac:spMk id="1051" creationId="{97A51752-AD5A-0665-C487-A1800E9AC317}"/>
+          </ac:spMkLst>
+        </pc:spChg>
+        <pc:spChg chg="add mod">
+          <ac:chgData name="McCauley, Kathryn (NIH/NIAID) [C]" userId="8123e298-eaa7-4067-960e-8e9acda1581f" providerId="ADAL" clId="{0C402FB5-1208-C94F-B091-6134B46BEC84}" dt="2024-10-10T21:48:08.155" v="827" actId="1038"/>
+          <ac:spMkLst>
+            <pc:docMk/>
+            <pc:sldMk cId="1538252808" sldId="257"/>
+            <ac:spMk id="1052" creationId="{94033C18-6A72-AC41-3368-2E4B5A8C1E96}"/>
+          </ac:spMkLst>
+        </pc:spChg>
+        <pc:spChg chg="add mod">
+          <ac:chgData name="McCauley, Kathryn (NIH/NIAID) [C]" userId="8123e298-eaa7-4067-960e-8e9acda1581f" providerId="ADAL" clId="{0C402FB5-1208-C94F-B091-6134B46BEC84}" dt="2024-10-10T21:49:14.823" v="836" actId="1038"/>
+          <ac:spMkLst>
+            <pc:docMk/>
+            <pc:sldMk cId="1538252808" sldId="257"/>
+            <ac:spMk id="1054" creationId="{29F0411E-5C50-7F39-8AFA-B8673F40CCDF}"/>
+          </ac:spMkLst>
+        </pc:spChg>
+        <pc:spChg chg="mod">
+          <ac:chgData name="McCauley, Kathryn (NIH/NIAID) [C]" userId="8123e298-eaa7-4067-960e-8e9acda1581f" providerId="ADAL" clId="{0C402FB5-1208-C94F-B091-6134B46BEC84}" dt="2024-10-10T21:58:13.878" v="1148" actId="1076"/>
+          <ac:spMkLst>
+            <pc:docMk/>
+            <pc:sldMk cId="1538252808" sldId="257"/>
+            <ac:spMk id="1057" creationId="{31CE9A01-ECF3-3B21-723C-0AA742AAE434}"/>
+          </ac:spMkLst>
+        </pc:spChg>
+        <pc:spChg chg="mod">
+          <ac:chgData name="McCauley, Kathryn (NIH/NIAID) [C]" userId="8123e298-eaa7-4067-960e-8e9acda1581f" providerId="ADAL" clId="{0C402FB5-1208-C94F-B091-6134B46BEC84}" dt="2024-10-10T21:58:29.545" v="1154" actId="20577"/>
+          <ac:spMkLst>
+            <pc:docMk/>
+            <pc:sldMk cId="1538252808" sldId="257"/>
+            <ac:spMk id="1058" creationId="{FB0E8DB1-25FA-A254-68F2-936406C7F8E4}"/>
+          </ac:spMkLst>
+        </pc:spChg>
+        <pc:spChg chg="add mod">
+          <ac:chgData name="McCauley, Kathryn (NIH/NIAID) [C]" userId="8123e298-eaa7-4067-960e-8e9acda1581f" providerId="ADAL" clId="{0C402FB5-1208-C94F-B091-6134B46BEC84}" dt="2024-10-10T21:49:26.955" v="845" actId="1038"/>
+          <ac:spMkLst>
+            <pc:docMk/>
+            <pc:sldMk cId="1538252808" sldId="257"/>
+            <ac:spMk id="1059" creationId="{77F9B1C3-8A8B-4BC4-EC93-3D7D5A9949EF}"/>
+          </ac:spMkLst>
+        </pc:spChg>
+        <pc:spChg chg="add mod">
+          <ac:chgData name="McCauley, Kathryn (NIH/NIAID) [C]" userId="8123e298-eaa7-4067-960e-8e9acda1581f" providerId="ADAL" clId="{0C402FB5-1208-C94F-B091-6134B46BEC84}" dt="2024-10-10T21:49:38.185" v="852" actId="1038"/>
+          <ac:spMkLst>
+            <pc:docMk/>
+            <pc:sldMk cId="1538252808" sldId="257"/>
+            <ac:spMk id="1061" creationId="{B6C230F7-31C0-A912-5387-98999C145C6C}"/>
+          </ac:spMkLst>
+        </pc:spChg>
+        <pc:spChg chg="add mod">
+          <ac:chgData name="McCauley, Kathryn (NIH/NIAID) [C]" userId="8123e298-eaa7-4067-960e-8e9acda1581f" providerId="ADAL" clId="{0C402FB5-1208-C94F-B091-6134B46BEC84}" dt="2024-10-10T21:51:58.537" v="854" actId="1076"/>
+          <ac:spMkLst>
+            <pc:docMk/>
+            <pc:sldMk cId="1538252808" sldId="257"/>
+            <ac:spMk id="1067" creationId="{96B8CFF2-9618-F326-E641-2F61D79439BC}"/>
+          </ac:spMkLst>
+        </pc:spChg>
+        <pc:spChg chg="add mod">
+          <ac:chgData name="McCauley, Kathryn (NIH/NIAID) [C]" userId="8123e298-eaa7-4067-960e-8e9acda1581f" providerId="ADAL" clId="{0C402FB5-1208-C94F-B091-6134B46BEC84}" dt="2024-10-10T21:52:09.687" v="856" actId="1076"/>
+          <ac:spMkLst>
+            <pc:docMk/>
+            <pc:sldMk cId="1538252808" sldId="257"/>
+            <ac:spMk id="1068" creationId="{EDD1FC50-927F-44B5-D94F-9AF7F86095F1}"/>
+          </ac:spMkLst>
+        </pc:spChg>
+        <pc:spChg chg="add mod">
+          <ac:chgData name="McCauley, Kathryn (NIH/NIAID) [C]" userId="8123e298-eaa7-4067-960e-8e9acda1581f" providerId="ADAL" clId="{0C402FB5-1208-C94F-B091-6134B46BEC84}" dt="2024-10-10T21:52:15.692" v="858" actId="1076"/>
+          <ac:spMkLst>
+            <pc:docMk/>
+            <pc:sldMk cId="1538252808" sldId="257"/>
+            <ac:spMk id="1069" creationId="{BA02B8B7-CC93-63DF-FC38-5FCF926AA8E8}"/>
+          </ac:spMkLst>
+        </pc:spChg>
+        <pc:spChg chg="add mod">
+          <ac:chgData name="McCauley, Kathryn (NIH/NIAID) [C]" userId="8123e298-eaa7-4067-960e-8e9acda1581f" providerId="ADAL" clId="{0C402FB5-1208-C94F-B091-6134B46BEC84}" dt="2024-10-10T21:56:00.979" v="1116"/>
+          <ac:spMkLst>
+            <pc:docMk/>
+            <pc:sldMk cId="1538252808" sldId="257"/>
+            <ac:spMk id="1074" creationId="{7AF65165-85C2-304E-C251-ABC28DA4724D}"/>
+          </ac:spMkLst>
+        </pc:spChg>
+        <pc:spChg chg="mod">
+          <ac:chgData name="McCauley, Kathryn (NIH/NIAID) [C]" userId="8123e298-eaa7-4067-960e-8e9acda1581f" providerId="ADAL" clId="{0C402FB5-1208-C94F-B091-6134B46BEC84}" dt="2024-10-10T21:57:28.954" v="1142" actId="113"/>
+          <ac:spMkLst>
+            <pc:docMk/>
+            <pc:sldMk cId="1538252808" sldId="257"/>
+            <ac:spMk id="1083" creationId="{322CBFEC-637B-8C92-6695-8EB8C74A9977}"/>
+          </ac:spMkLst>
+        </pc:spChg>
+        <pc:spChg chg="mod">
+          <ac:chgData name="McCauley, Kathryn (NIH/NIAID) [C]" userId="8123e298-eaa7-4067-960e-8e9acda1581f" providerId="ADAL" clId="{0C402FB5-1208-C94F-B091-6134B46BEC84}" dt="2024-10-10T21:58:42.342" v="1160" actId="1037"/>
+          <ac:spMkLst>
+            <pc:docMk/>
+            <pc:sldMk cId="1538252808" sldId="257"/>
+            <ac:spMk id="1084" creationId="{8F2D0482-62F7-5F76-3845-419B31A811D6}"/>
+          </ac:spMkLst>
+        </pc:spChg>
+        <pc:picChg chg="mod">
+          <ac:chgData name="McCauley, Kathryn (NIH/NIAID) [C]" userId="8123e298-eaa7-4067-960e-8e9acda1581f" providerId="ADAL" clId="{0C402FB5-1208-C94F-B091-6134B46BEC84}" dt="2024-10-10T21:18:59.036" v="48" actId="1035"/>
+          <ac:picMkLst>
+            <pc:docMk/>
+            <pc:sldMk cId="1538252808" sldId="257"/>
+            <ac:picMk id="35" creationId="{A1FF18F0-2D41-99CC-797A-96EC43C2F043}"/>
+          </ac:picMkLst>
+        </pc:picChg>
+      </pc:sldChg>
+    </pc:docChg>
+  </pc:docChgLst>
+</pc:chgInfo>
 </file>
 
 <file path=ppt/slideLayouts/slideLayout1.xml><?xml version="1.0" encoding="utf-8"?>
@@ -252,7 +504,7 @@
           <a:p>
             <a:fld id="{DDCDFDCF-5B5E-9D4E-AA60-E7B60AA046F2}" type="datetimeFigureOut">
               <a:rPr lang="en-US" smtClean="0"/>
-              <a:t>10/9/24</a:t>
+              <a:t>10/10/24</a:t>
             </a:fld>
             <a:endParaRPr lang="en-US"/>
           </a:p>
@@ -422,7 +674,7 @@
           <a:p>
             <a:fld id="{DDCDFDCF-5B5E-9D4E-AA60-E7B60AA046F2}" type="datetimeFigureOut">
               <a:rPr lang="en-US" smtClean="0"/>
-              <a:t>10/9/24</a:t>
+              <a:t>10/10/24</a:t>
             </a:fld>
             <a:endParaRPr lang="en-US"/>
           </a:p>
@@ -602,7 +854,7 @@
           <a:p>
             <a:fld id="{DDCDFDCF-5B5E-9D4E-AA60-E7B60AA046F2}" type="datetimeFigureOut">
               <a:rPr lang="en-US" smtClean="0"/>
-              <a:t>10/9/24</a:t>
+              <a:t>10/10/24</a:t>
             </a:fld>
             <a:endParaRPr lang="en-US"/>
           </a:p>
@@ -772,7 +1024,7 @@
           <a:p>
             <a:fld id="{DDCDFDCF-5B5E-9D4E-AA60-E7B60AA046F2}" type="datetimeFigureOut">
               <a:rPr lang="en-US" smtClean="0"/>
-              <a:t>10/9/24</a:t>
+              <a:t>10/10/24</a:t>
             </a:fld>
             <a:endParaRPr lang="en-US"/>
           </a:p>
@@ -1018,7 +1270,7 @@
           <a:p>
             <a:fld id="{DDCDFDCF-5B5E-9D4E-AA60-E7B60AA046F2}" type="datetimeFigureOut">
               <a:rPr lang="en-US" smtClean="0"/>
-              <a:t>10/9/24</a:t>
+              <a:t>10/10/24</a:t>
             </a:fld>
             <a:endParaRPr lang="en-US"/>
           </a:p>
@@ -1250,7 +1502,7 @@
           <a:p>
             <a:fld id="{DDCDFDCF-5B5E-9D4E-AA60-E7B60AA046F2}" type="datetimeFigureOut">
               <a:rPr lang="en-US" smtClean="0"/>
-              <a:t>10/9/24</a:t>
+              <a:t>10/10/24</a:t>
             </a:fld>
             <a:endParaRPr lang="en-US"/>
           </a:p>
@@ -1617,7 +1869,7 @@
           <a:p>
             <a:fld id="{DDCDFDCF-5B5E-9D4E-AA60-E7B60AA046F2}" type="datetimeFigureOut">
               <a:rPr lang="en-US" smtClean="0"/>
-              <a:t>10/9/24</a:t>
+              <a:t>10/10/24</a:t>
             </a:fld>
             <a:endParaRPr lang="en-US"/>
           </a:p>
@@ -1735,7 +1987,7 @@
           <a:p>
             <a:fld id="{DDCDFDCF-5B5E-9D4E-AA60-E7B60AA046F2}" type="datetimeFigureOut">
               <a:rPr lang="en-US" smtClean="0"/>
-              <a:t>10/9/24</a:t>
+              <a:t>10/10/24</a:t>
             </a:fld>
             <a:endParaRPr lang="en-US"/>
           </a:p>
@@ -1830,7 +2082,7 @@
           <a:p>
             <a:fld id="{DDCDFDCF-5B5E-9D4E-AA60-E7B60AA046F2}" type="datetimeFigureOut">
               <a:rPr lang="en-US" smtClean="0"/>
-              <a:t>10/9/24</a:t>
+              <a:t>10/10/24</a:t>
             </a:fld>
             <a:endParaRPr lang="en-US"/>
           </a:p>
@@ -2107,7 +2359,7 @@
           <a:p>
             <a:fld id="{DDCDFDCF-5B5E-9D4E-AA60-E7B60AA046F2}" type="datetimeFigureOut">
               <a:rPr lang="en-US" smtClean="0"/>
-              <a:t>10/9/24</a:t>
+              <a:t>10/10/24</a:t>
             </a:fld>
             <a:endParaRPr lang="en-US"/>
           </a:p>
@@ -2364,7 +2616,7 @@
           <a:p>
             <a:fld id="{DDCDFDCF-5B5E-9D4E-AA60-E7B60AA046F2}" type="datetimeFigureOut">
               <a:rPr lang="en-US" smtClean="0"/>
-              <a:t>10/9/24</a:t>
+              <a:t>10/10/24</a:t>
             </a:fld>
             <a:endParaRPr lang="en-US"/>
           </a:p>
@@ -2577,7 +2829,7 @@
           <a:p>
             <a:fld id="{DDCDFDCF-5B5E-9D4E-AA60-E7B60AA046F2}" type="datetimeFigureOut">
               <a:rPr lang="en-US" smtClean="0"/>
-              <a:t>10/9/24</a:t>
+              <a:t>10/10/24</a:t>
             </a:fld>
             <a:endParaRPr lang="en-US"/>
           </a:p>
@@ -3505,8 +3757,8 @@
         </p:nvSpPr>
         <p:spPr>
           <a:xfrm>
-            <a:off x="23289474" y="26745753"/>
-            <a:ext cx="2927208" cy="4031873"/>
+            <a:off x="22991526" y="26862716"/>
+            <a:ext cx="3225156" cy="3539430"/>
           </a:xfrm>
           <a:prstGeom prst="rect">
             <a:avLst/>
@@ -3567,13 +3819,15 @@
               </a:rPr>
               <a:t>mechanistic</a:t>
             </a:r>
+          </a:p>
+          <a:p>
             <a:r>
               <a:rPr lang="en-US" sz="3200" dirty="0">
                 <a:latin typeface="Roboto" panose="02000000000000000000" pitchFamily="2" charset="0"/>
                 <a:ea typeface="Roboto" panose="02000000000000000000" pitchFamily="2" charset="0"/>
                 <a:cs typeface="Roboto" panose="02000000000000000000" pitchFamily="2" charset="0"/>
               </a:rPr>
-              <a:t> PI-ME/CFS research at NIH!</a:t>
+              <a:t>PI-ME/CFS research at NIH!</a:t>
             </a:r>
           </a:p>
         </p:txBody>
@@ -4522,7 +4776,7 @@
                 <a:ea typeface="Roboto" panose="02000000000000000000" pitchFamily="2" charset="0"/>
                 <a:cs typeface="Roboto" panose="02000000000000000000" pitchFamily="2" charset="0"/>
               </a:rPr>
-              <a:t>Reduced </a:t>
+              <a:t>Have Reduced </a:t>
             </a:r>
             <a:r>
               <a:rPr lang="en-US" sz="11500" b="1" dirty="0">
@@ -4544,7 +4798,7 @@
                 <a:ea typeface="Roboto" panose="02000000000000000000" pitchFamily="2" charset="0"/>
                 <a:cs typeface="Roboto" panose="02000000000000000000" pitchFamily="2" charset="0"/>
               </a:rPr>
-              <a:t>and Have</a:t>
+              <a:t>and</a:t>
             </a:r>
           </a:p>
           <a:p>
@@ -5155,7 +5409,7 @@
           </p:nvSpPr>
           <p:spPr>
             <a:xfrm>
-              <a:off x="18546712" y="18802977"/>
+              <a:off x="18262232" y="18802977"/>
               <a:ext cx="2731966" cy="369332"/>
             </a:xfrm>
             <a:prstGeom prst="rect">
@@ -6620,8 +6874,8 @@
         </p:nvSpPr>
         <p:spPr>
           <a:xfrm>
-            <a:off x="21592108" y="9806440"/>
-            <a:ext cx="2455945" cy="6494085"/>
+            <a:off x="21633574" y="10247836"/>
+            <a:ext cx="2800771" cy="5755422"/>
           </a:xfrm>
           <a:prstGeom prst="rect">
             <a:avLst/>
@@ -6648,7 +6902,23 @@
                 <a:ea typeface="Roboto" panose="02000000000000000000" pitchFamily="2" charset="0"/>
                 <a:cs typeface="Roboto" panose="02000000000000000000" pitchFamily="2" charset="0"/>
               </a:rPr>
-              <a:t>(A) PI-ME/CFS gut microbiota exhibits reduced richness but not diversity. (B) The IgG-negative fraction has reduced richness and diversity compared to the Pre-sort and IgG-Positive fractions (c) This difference occurs in a condition specific manner across all three fractions. (d) Microbiota composition between PI-ME/CFS and HV is distinct. (e) Canberra composition of all three fractions, linking within-subject samples. (f) IgG Negative fractions are compositionally-distinct from Pre-sort and IgG-Positive fractions, with no difference between PI-ME/CFS and HV.</a:t>
+              <a:t>(A) PI-ME/CFS gut microbiota exhibits </a:t>
+            </a:r>
+            <a:r>
+              <a:rPr lang="en-US" sz="1600" b="1" dirty="0">
+                <a:latin typeface="Roboto" panose="02000000000000000000" pitchFamily="2" charset="0"/>
+                <a:ea typeface="Roboto" panose="02000000000000000000" pitchFamily="2" charset="0"/>
+                <a:cs typeface="Roboto" panose="02000000000000000000" pitchFamily="2" charset="0"/>
+              </a:rPr>
+              <a:t>reduced richness </a:t>
+            </a:r>
+            <a:r>
+              <a:rPr lang="en-US" sz="1600" dirty="0">
+                <a:latin typeface="Roboto" panose="02000000000000000000" pitchFamily="2" charset="0"/>
+                <a:ea typeface="Roboto" panose="02000000000000000000" pitchFamily="2" charset="0"/>
+                <a:cs typeface="Roboto" panose="02000000000000000000" pitchFamily="2" charset="0"/>
+              </a:rPr>
+              <a:t>but not diversity. (B) The IgG-negative fraction has reduced richness and diversity compared to the Pre-sort and IgG-Positive fractions (c) This difference occurs in a condition specific manner across all three fractions. (d) Microbiota composition between PI-ME/CFS and HV is distinct. (e) Canberra composition of all three fractions, linking within-subject samples. (f) IgG Negative fractions are compositionally-distinct from Pre-sort and IgG-Positive fractions, with no difference between PI-ME/CFS and HV.</a:t>
             </a:r>
           </a:p>
         </p:txBody>
@@ -7156,10 +7426,66 @@
                 <a:ea typeface="Roboto" panose="02000000000000000000" pitchFamily="2" charset="0"/>
                 <a:cs typeface="Roboto" panose="02000000000000000000" pitchFamily="2" charset="0"/>
               </a:rPr>
-              <a:t>Interaction correlations of cytokines with IgG scores in (A) plasma and (B) cerebrospinal fluid. Correlations were performed within PI-ME/CFS and HV separately using a non-parametric </a:t>
-            </a:r>
-            <a:r>
-              <a:rPr lang="en-US" sz="1600" dirty="0" err="1">
+              <a:t>Interaction correlations of </a:t>
+            </a:r>
+            <a:r>
+              <a:rPr lang="en-US" sz="1600" b="1" dirty="0">
+                <a:latin typeface="Roboto" panose="02000000000000000000" pitchFamily="2" charset="0"/>
+                <a:ea typeface="Roboto" panose="02000000000000000000" pitchFamily="2" charset="0"/>
+                <a:cs typeface="Roboto" panose="02000000000000000000" pitchFamily="2" charset="0"/>
+              </a:rPr>
+              <a:t>cytokines</a:t>
+            </a:r>
+            <a:r>
+              <a:rPr lang="en-US" sz="1600" dirty="0">
+                <a:latin typeface="Roboto" panose="02000000000000000000" pitchFamily="2" charset="0"/>
+                <a:ea typeface="Roboto" panose="02000000000000000000" pitchFamily="2" charset="0"/>
+                <a:cs typeface="Roboto" panose="02000000000000000000" pitchFamily="2" charset="0"/>
+              </a:rPr>
+              <a:t> with IgG scores in (A) </a:t>
+            </a:r>
+            <a:r>
+              <a:rPr lang="en-US" sz="1600" b="1" dirty="0">
+                <a:latin typeface="Roboto" panose="02000000000000000000" pitchFamily="2" charset="0"/>
+                <a:ea typeface="Roboto" panose="02000000000000000000" pitchFamily="2" charset="0"/>
+                <a:cs typeface="Roboto" panose="02000000000000000000" pitchFamily="2" charset="0"/>
+              </a:rPr>
+              <a:t>plasma</a:t>
+            </a:r>
+            <a:r>
+              <a:rPr lang="en-US" sz="1600" dirty="0">
+                <a:latin typeface="Roboto" panose="02000000000000000000" pitchFamily="2" charset="0"/>
+                <a:ea typeface="Roboto" panose="02000000000000000000" pitchFamily="2" charset="0"/>
+                <a:cs typeface="Roboto" panose="02000000000000000000" pitchFamily="2" charset="0"/>
+              </a:rPr>
+              <a:t> and (B) </a:t>
+            </a:r>
+            <a:r>
+              <a:rPr lang="en-US" sz="1600" b="1" dirty="0">
+                <a:latin typeface="Roboto" panose="02000000000000000000" pitchFamily="2" charset="0"/>
+                <a:ea typeface="Roboto" panose="02000000000000000000" pitchFamily="2" charset="0"/>
+                <a:cs typeface="Roboto" panose="02000000000000000000" pitchFamily="2" charset="0"/>
+              </a:rPr>
+              <a:t>cerebrospinal fluid</a:t>
+            </a:r>
+            <a:r>
+              <a:rPr lang="en-US" sz="1600" dirty="0">
+                <a:latin typeface="Roboto" panose="02000000000000000000" pitchFamily="2" charset="0"/>
+                <a:ea typeface="Roboto" panose="02000000000000000000" pitchFamily="2" charset="0"/>
+                <a:cs typeface="Roboto" panose="02000000000000000000" pitchFamily="2" charset="0"/>
+              </a:rPr>
+              <a:t>. Correlations were performed within PI-ME/CFS and HV separately using a </a:t>
+            </a:r>
+            <a:r>
+              <a:rPr lang="en-US" sz="1600" b="1" dirty="0">
+                <a:latin typeface="Roboto" panose="02000000000000000000" pitchFamily="2" charset="0"/>
+                <a:ea typeface="Roboto" panose="02000000000000000000" pitchFamily="2" charset="0"/>
+                <a:cs typeface="Roboto" panose="02000000000000000000" pitchFamily="2" charset="0"/>
+              </a:rPr>
+              <a:t>non-parametric </a:t>
+            </a:r>
+            <a:r>
+              <a:rPr lang="en-US" sz="1600" b="1" dirty="0" err="1">
                 <a:latin typeface="Roboto" panose="02000000000000000000" pitchFamily="2" charset="0"/>
                 <a:ea typeface="Roboto" panose="02000000000000000000" pitchFamily="2" charset="0"/>
                 <a:cs typeface="Roboto" panose="02000000000000000000" pitchFamily="2" charset="0"/>
@@ -7167,12 +7493,36 @@
               <a:t>boostrap</a:t>
             </a:r>
             <a:r>
+              <a:rPr lang="en-US" sz="1600" b="1" dirty="0">
+                <a:latin typeface="Roboto" panose="02000000000000000000" pitchFamily="2" charset="0"/>
+                <a:ea typeface="Roboto" panose="02000000000000000000" pitchFamily="2" charset="0"/>
+                <a:cs typeface="Roboto" panose="02000000000000000000" pitchFamily="2" charset="0"/>
+              </a:rPr>
+              <a:t> </a:t>
+            </a:r>
+            <a:r>
               <a:rPr lang="en-US" sz="1600" dirty="0">
                 <a:latin typeface="Roboto" panose="02000000000000000000" pitchFamily="2" charset="0"/>
                 <a:ea typeface="Roboto" panose="02000000000000000000" pitchFamily="2" charset="0"/>
                 <a:cs typeface="Roboto" panose="02000000000000000000" pitchFamily="2" charset="0"/>
               </a:rPr>
-              <a:t> test. Interactions were identified when there was less than 5% overlap between confidence intervals. Significant taxa-cytokine interactions are grouped by ASV and sorted by significance from Figure 2.</a:t>
+              <a:t>test. Interactions were identified when there was less than 5% overlap between confidence intervals. Significant taxa-cytokine interactions are </a:t>
+            </a:r>
+            <a:r>
+              <a:rPr lang="en-US" sz="1600" b="1" dirty="0">
+                <a:latin typeface="Roboto" panose="02000000000000000000" pitchFamily="2" charset="0"/>
+                <a:ea typeface="Roboto" panose="02000000000000000000" pitchFamily="2" charset="0"/>
+                <a:cs typeface="Roboto" panose="02000000000000000000" pitchFamily="2" charset="0"/>
+              </a:rPr>
+              <a:t>grouped by ASV and sorted by significance </a:t>
+            </a:r>
+            <a:r>
+              <a:rPr lang="en-US" sz="1600" dirty="0">
+                <a:latin typeface="Roboto" panose="02000000000000000000" pitchFamily="2" charset="0"/>
+                <a:ea typeface="Roboto" panose="02000000000000000000" pitchFamily="2" charset="0"/>
+                <a:cs typeface="Roboto" panose="02000000000000000000" pitchFamily="2" charset="0"/>
+              </a:rPr>
+              <a:t>from Figure 2.</a:t>
             </a:r>
           </a:p>
         </p:txBody>
@@ -7191,8 +7541,8 @@
         </p:nvSpPr>
         <p:spPr>
           <a:xfrm>
-            <a:off x="35611951" y="19791735"/>
-            <a:ext cx="2894887" cy="4770537"/>
+            <a:off x="35558786" y="19791735"/>
+            <a:ext cx="3079928" cy="5755422"/>
           </a:xfrm>
           <a:prstGeom prst="rect">
             <a:avLst/>
@@ -7219,7 +7569,39 @@
                 <a:ea typeface="Roboto" panose="02000000000000000000" pitchFamily="2" charset="0"/>
                 <a:cs typeface="Roboto" panose="02000000000000000000" pitchFamily="2" charset="0"/>
               </a:rPr>
-              <a:t>Peak-to-Trough Ratios (PTRs) for taxa with differential translocation effects are higher in Healthy Volunteers than PI-ME/CFS. Points indicate the Mean Difference in PTR, with the IgG effect size (see Figure 2) represented by the size of the circle. Red indicates that the difference in PTR between groups exhibited modest trends (</a:t>
+              <a:t>Peak-to-Trough Ratios (PTRs) for taxa with differential translocation are higher in Healthy Volunteers than PI-ME/CFS. Points indicate the </a:t>
+            </a:r>
+            <a:r>
+              <a:rPr lang="en-US" sz="1600" b="1" dirty="0">
+                <a:latin typeface="Roboto" panose="02000000000000000000" pitchFamily="2" charset="0"/>
+                <a:ea typeface="Roboto" panose="02000000000000000000" pitchFamily="2" charset="0"/>
+                <a:cs typeface="Roboto" panose="02000000000000000000" pitchFamily="2" charset="0"/>
+              </a:rPr>
+              <a:t>Mean Difference in PTR</a:t>
+            </a:r>
+            <a:r>
+              <a:rPr lang="en-US" sz="1600" dirty="0">
+                <a:latin typeface="Roboto" panose="02000000000000000000" pitchFamily="2" charset="0"/>
+                <a:ea typeface="Roboto" panose="02000000000000000000" pitchFamily="2" charset="0"/>
+                <a:cs typeface="Roboto" panose="02000000000000000000" pitchFamily="2" charset="0"/>
+              </a:rPr>
+              <a:t>, with the IgG effect size (see Figure 2) represented by the size of the circle. A red </a:t>
+            </a:r>
+            <a:r>
+              <a:rPr lang="en-US" sz="1600" b="1" dirty="0">
+                <a:latin typeface="Roboto" panose="02000000000000000000" pitchFamily="2" charset="0"/>
+                <a:ea typeface="Roboto" panose="02000000000000000000" pitchFamily="2" charset="0"/>
+                <a:cs typeface="Roboto" panose="02000000000000000000" pitchFamily="2" charset="0"/>
+              </a:rPr>
+              <a:t>outline</a:t>
+            </a:r>
+            <a:r>
+              <a:rPr lang="en-US" sz="1600" dirty="0">
+                <a:latin typeface="Roboto" panose="02000000000000000000" pitchFamily="2" charset="0"/>
+                <a:ea typeface="Roboto" panose="02000000000000000000" pitchFamily="2" charset="0"/>
+                <a:cs typeface="Roboto" panose="02000000000000000000" pitchFamily="2" charset="0"/>
+              </a:rPr>
+              <a:t> indicates that the difference in PTR between groups exhibited modest trends (</a:t>
             </a:r>
             <a:r>
               <a:rPr lang="en-US" sz="1600" i="1" dirty="0">
@@ -7235,7 +7617,39 @@
                 <a:ea typeface="Roboto" panose="02000000000000000000" pitchFamily="2" charset="0"/>
                 <a:cs typeface="Roboto" panose="02000000000000000000" pitchFamily="2" charset="0"/>
               </a:rPr>
-              <a:t> &lt; 0.2). PTRs were obtained from metagenomic reads. Representative sequences from IgG-seq analysis were mapped to reference genomes to link IgG scores to PTR values.</a:t>
+              <a:t> &lt; 0.2). PTRs were obtained from </a:t>
+            </a:r>
+            <a:r>
+              <a:rPr lang="en-US" sz="1600" b="1" dirty="0">
+                <a:latin typeface="Roboto" panose="02000000000000000000" pitchFamily="2" charset="0"/>
+                <a:ea typeface="Roboto" panose="02000000000000000000" pitchFamily="2" charset="0"/>
+                <a:cs typeface="Roboto" panose="02000000000000000000" pitchFamily="2" charset="0"/>
+              </a:rPr>
+              <a:t>paired metagenomic samples </a:t>
+            </a:r>
+            <a:r>
+              <a:rPr lang="en-US" sz="1600" dirty="0">
+                <a:latin typeface="Roboto" panose="02000000000000000000" pitchFamily="2" charset="0"/>
+                <a:ea typeface="Roboto" panose="02000000000000000000" pitchFamily="2" charset="0"/>
+                <a:cs typeface="Roboto" panose="02000000000000000000" pitchFamily="2" charset="0"/>
+              </a:rPr>
+              <a:t>applied to a curated database of stool genomes. Representative sequences from IgG-seq analysis were mapped to reference genomes to link IgG scores to PTR values. </a:t>
+            </a:r>
+            <a:r>
+              <a:rPr lang="en-US" sz="1600" b="1" dirty="0">
+                <a:latin typeface="Roboto" panose="02000000000000000000" pitchFamily="2" charset="0"/>
+                <a:ea typeface="Roboto" panose="02000000000000000000" pitchFamily="2" charset="0"/>
+                <a:cs typeface="Roboto" panose="02000000000000000000" pitchFamily="2" charset="0"/>
+              </a:rPr>
+              <a:t>Circles</a:t>
+            </a:r>
+            <a:r>
+              <a:rPr lang="en-US" sz="1600" dirty="0">
+                <a:latin typeface="Roboto" panose="02000000000000000000" pitchFamily="2" charset="0"/>
+                <a:ea typeface="Roboto" panose="02000000000000000000" pitchFamily="2" charset="0"/>
+                <a:cs typeface="Roboto" panose="02000000000000000000" pitchFamily="2" charset="0"/>
+              </a:rPr>
+              <a:t> to the left of y-axis labels indicate the directionality of IgG-score differences from Figure 2.</a:t>
             </a:r>
           </a:p>
         </p:txBody>
@@ -7329,8 +7743,8 @@
         </p:nvSpPr>
         <p:spPr>
           <a:xfrm>
-            <a:off x="10077603" y="28263110"/>
-            <a:ext cx="12361146" cy="1323439"/>
+            <a:off x="10077603" y="28933670"/>
+            <a:ext cx="12361146" cy="1015663"/>
           </a:xfrm>
           <a:prstGeom prst="rect">
             <a:avLst/>
@@ -7349,7 +7763,7 @@
                 <a:ea typeface="Roboto" panose="02000000000000000000" pitchFamily="2" charset="0"/>
                 <a:cs typeface="Roboto" panose="02000000000000000000" pitchFamily="2" charset="0"/>
               </a:rPr>
-              <a:t>In ”Autologous” IgG-seq, in which the stool sample and serum sample are derived from the same subject, no bacterial counts in both pools results in a missing value for IgG-seq scores for that taxon and no currently-accepted methods for recovering those zeroes and missing values exist, leading to difficulty in interpretation and generalization of results.</a:t>
+              <a:t>In ”Autologous” IgG-seq, in which the stool sample and serum sample are derived from the same subject, no bacterial counts in both pools results in a missing value for IgG-seq scores for that taxon and limited techniques are available to recover meaningful values for those taxa.</a:t>
             </a:r>
           </a:p>
         </p:txBody>
@@ -7414,7 +7828,7 @@
         </p:blipFill>
         <p:spPr>
           <a:xfrm>
-            <a:off x="33860226" y="14594190"/>
+            <a:off x="33860226" y="14675470"/>
             <a:ext cx="4150683" cy="2450969"/>
           </a:xfrm>
           <a:prstGeom prst="rect">
@@ -7436,7 +7850,7 @@
         </p:nvSpPr>
         <p:spPr>
           <a:xfrm>
-            <a:off x="33860226" y="14013306"/>
+            <a:off x="33860226" y="14094586"/>
             <a:ext cx="4134292" cy="646331"/>
           </a:xfrm>
           <a:prstGeom prst="rect">
@@ -7516,7 +7930,7 @@
         </p:nvSpPr>
         <p:spPr>
           <a:xfrm>
-            <a:off x="10077603" y="29711259"/>
+            <a:off x="10077603" y="30117659"/>
             <a:ext cx="12361146" cy="707886"/>
           </a:xfrm>
           <a:prstGeom prst="rect">
@@ -8831,8 +9245,8 @@
         </p:nvSpPr>
         <p:spPr>
           <a:xfrm>
-            <a:off x="34952426" y="9819200"/>
-            <a:ext cx="2616486" cy="4031873"/>
+            <a:off x="35074346" y="9766035"/>
+            <a:ext cx="2616486" cy="4278094"/>
           </a:xfrm>
           <a:prstGeom prst="rect">
             <a:avLst/>
@@ -8859,7 +9273,7 @@
                 <a:ea typeface="Roboto" panose="02000000000000000000" pitchFamily="2" charset="0"/>
                 <a:cs typeface="Roboto" panose="02000000000000000000" pitchFamily="2" charset="0"/>
               </a:rPr>
-              <a:t>Differential IgG scores were observed between HV and ME/CFS for 20 bacterial taxa. Taxa are sorted by the magnitude of difference between ME/CFS and HV. Points represent the IgG Score, with positive values indicating relatively increased IgG response for that taxon and negative values indicating decreased IgG response. Results are from a linear model with </a:t>
+              <a:t>Differential IgG scores were observed between HV and PI-ME/CFS for 20 bacterial taxa. Taxa are sorted by the magnitude of difference between PI-ME/CFS and HV. Points represent the IgG Score, with positive values indicating relatively increased IgG response for that taxon and negative values indicating decreased IgG response. Results are from a linear model with </a:t>
             </a:r>
             <a:r>
               <a:rPr lang="en-US" sz="1600" i="1" dirty="0">
@@ -8867,7 +9281,7 @@
                 <a:ea typeface="Roboto" panose="02000000000000000000" pitchFamily="2" charset="0"/>
                 <a:cs typeface="Roboto" panose="02000000000000000000" pitchFamily="2" charset="0"/>
               </a:rPr>
-              <a:t>p</a:t>
+              <a:t>P</a:t>
             </a:r>
             <a:r>
               <a:rPr lang="en-US" sz="1600" dirty="0">
@@ -8925,6 +9339,941 @@
           </a:extLst>
         </p:spPr>
       </p:pic>
+      <p:sp>
+        <p:nvSpPr>
+          <p:cNvPr id="3" name="TextBox 2">
+            <a:extLst>
+              <a:ext uri="{FF2B5EF4-FFF2-40B4-BE49-F238E27FC236}">
+                <a16:creationId xmlns:a16="http://schemas.microsoft.com/office/drawing/2014/main" id="{2F1BB749-BE6B-7121-DDEC-86CBB96B86A4}"/>
+              </a:ext>
+            </a:extLst>
+          </p:cNvPr>
+          <p:cNvSpPr txBox="1"/>
+          <p:nvPr/>
+        </p:nvSpPr>
+        <p:spPr>
+          <a:xfrm>
+            <a:off x="10077603" y="28067742"/>
+            <a:ext cx="12361146" cy="707886"/>
+          </a:xfrm>
+          <a:prstGeom prst="rect">
+            <a:avLst/>
+          </a:prstGeom>
+          <a:noFill/>
+        </p:spPr>
+        <p:txBody>
+          <a:bodyPr wrap="square" rtlCol="0">
+            <a:spAutoFit/>
+          </a:bodyPr>
+          <a:lstStyle/>
+          <a:p>
+            <a:r>
+              <a:rPr lang="en-US" sz="2000" dirty="0">
+                <a:latin typeface="Roboto" panose="02000000000000000000" pitchFamily="2" charset="0"/>
+                <a:ea typeface="Roboto" panose="02000000000000000000" pitchFamily="2" charset="0"/>
+                <a:cs typeface="Roboto" panose="02000000000000000000" pitchFamily="2" charset="0"/>
+              </a:rPr>
+              <a:t>Amplicon sequencing has limited ability to provide information about bacterial functions, especially among bacteria with the potential to translocate</a:t>
+            </a:r>
+          </a:p>
+        </p:txBody>
+      </p:sp>
+      <p:sp>
+        <p:nvSpPr>
+          <p:cNvPr id="10" name="Oval 9">
+            <a:extLst>
+              <a:ext uri="{FF2B5EF4-FFF2-40B4-BE49-F238E27FC236}">
+                <a16:creationId xmlns:a16="http://schemas.microsoft.com/office/drawing/2014/main" id="{3FF8500E-F020-B67B-B2EC-6E060C812A30}"/>
+              </a:ext>
+            </a:extLst>
+          </p:cNvPr>
+          <p:cNvSpPr>
+            <a:spLocks noChangeAspect="1"/>
+          </p:cNvSpPr>
+          <p:nvPr/>
+        </p:nvSpPr>
+        <p:spPr>
+          <a:xfrm>
+            <a:off x="25779353" y="19513753"/>
+            <a:ext cx="228600" cy="228600"/>
+          </a:xfrm>
+          <a:prstGeom prst="ellipse">
+            <a:avLst/>
+          </a:prstGeom>
+          <a:solidFill>
+            <a:srgbClr val="FF0900"/>
+          </a:solidFill>
+          <a:ln>
+            <a:solidFill>
+              <a:schemeClr val="tx1"/>
+            </a:solidFill>
+          </a:ln>
+        </p:spPr>
+        <p:style>
+          <a:lnRef idx="2">
+            <a:schemeClr val="accent1">
+              <a:shade val="15000"/>
+            </a:schemeClr>
+          </a:lnRef>
+          <a:fillRef idx="1">
+            <a:schemeClr val="accent1"/>
+          </a:fillRef>
+          <a:effectRef idx="0">
+            <a:schemeClr val="accent1"/>
+          </a:effectRef>
+          <a:fontRef idx="minor">
+            <a:schemeClr val="lt1"/>
+          </a:fontRef>
+        </p:style>
+        <p:txBody>
+          <a:bodyPr rtlCol="0" anchor="ctr"/>
+          <a:lstStyle/>
+          <a:p>
+            <a:pPr algn="ctr"/>
+            <a:endParaRPr lang="en-US"/>
+          </a:p>
+        </p:txBody>
+      </p:sp>
+      <p:sp>
+        <p:nvSpPr>
+          <p:cNvPr id="33" name="Oval 32">
+            <a:extLst>
+              <a:ext uri="{FF2B5EF4-FFF2-40B4-BE49-F238E27FC236}">
+                <a16:creationId xmlns:a16="http://schemas.microsoft.com/office/drawing/2014/main" id="{C7A041FC-2FE3-CE2D-62AA-8623BDF14518}"/>
+              </a:ext>
+            </a:extLst>
+          </p:cNvPr>
+          <p:cNvSpPr>
+            <a:spLocks noChangeAspect="1"/>
+          </p:cNvSpPr>
+          <p:nvPr/>
+        </p:nvSpPr>
+        <p:spPr>
+          <a:xfrm>
+            <a:off x="26087292" y="19868138"/>
+            <a:ext cx="228600" cy="228600"/>
+          </a:xfrm>
+          <a:prstGeom prst="ellipse">
+            <a:avLst/>
+          </a:prstGeom>
+          <a:solidFill>
+            <a:srgbClr val="0F01FF"/>
+          </a:solidFill>
+          <a:ln>
+            <a:solidFill>
+              <a:schemeClr val="tx1"/>
+            </a:solidFill>
+          </a:ln>
+        </p:spPr>
+        <p:style>
+          <a:lnRef idx="2">
+            <a:schemeClr val="accent1">
+              <a:shade val="15000"/>
+            </a:schemeClr>
+          </a:lnRef>
+          <a:fillRef idx="1">
+            <a:schemeClr val="accent1"/>
+          </a:fillRef>
+          <a:effectRef idx="0">
+            <a:schemeClr val="accent1"/>
+          </a:effectRef>
+          <a:fontRef idx="minor">
+            <a:schemeClr val="lt1"/>
+          </a:fontRef>
+        </p:style>
+        <p:txBody>
+          <a:bodyPr rtlCol="0" anchor="ctr"/>
+          <a:lstStyle/>
+          <a:p>
+            <a:pPr algn="ctr"/>
+            <a:endParaRPr lang="en-US"/>
+          </a:p>
+        </p:txBody>
+      </p:sp>
+      <p:sp>
+        <p:nvSpPr>
+          <p:cNvPr id="34" name="Oval 33">
+            <a:extLst>
+              <a:ext uri="{FF2B5EF4-FFF2-40B4-BE49-F238E27FC236}">
+                <a16:creationId xmlns:a16="http://schemas.microsoft.com/office/drawing/2014/main" id="{6323F439-FCC2-49B2-CFD7-A85F32D5A215}"/>
+              </a:ext>
+            </a:extLst>
+          </p:cNvPr>
+          <p:cNvSpPr>
+            <a:spLocks noChangeAspect="1"/>
+          </p:cNvSpPr>
+          <p:nvPr/>
+        </p:nvSpPr>
+        <p:spPr>
+          <a:xfrm>
+            <a:off x="25930771" y="20194018"/>
+            <a:ext cx="228600" cy="228600"/>
+          </a:xfrm>
+          <a:prstGeom prst="ellipse">
+            <a:avLst/>
+          </a:prstGeom>
+          <a:solidFill>
+            <a:srgbClr val="0F01FF"/>
+          </a:solidFill>
+          <a:ln>
+            <a:solidFill>
+              <a:schemeClr val="tx1"/>
+            </a:solidFill>
+          </a:ln>
+        </p:spPr>
+        <p:style>
+          <a:lnRef idx="2">
+            <a:schemeClr val="accent1">
+              <a:shade val="15000"/>
+            </a:schemeClr>
+          </a:lnRef>
+          <a:fillRef idx="1">
+            <a:schemeClr val="accent1"/>
+          </a:fillRef>
+          <a:effectRef idx="0">
+            <a:schemeClr val="accent1"/>
+          </a:effectRef>
+          <a:fontRef idx="minor">
+            <a:schemeClr val="lt1"/>
+          </a:fontRef>
+        </p:style>
+        <p:txBody>
+          <a:bodyPr rtlCol="0" anchor="ctr"/>
+          <a:lstStyle/>
+          <a:p>
+            <a:pPr algn="ctr"/>
+            <a:endParaRPr lang="en-US"/>
+          </a:p>
+        </p:txBody>
+      </p:sp>
+      <p:sp>
+        <p:nvSpPr>
+          <p:cNvPr id="38" name="Oval 37">
+            <a:extLst>
+              <a:ext uri="{FF2B5EF4-FFF2-40B4-BE49-F238E27FC236}">
+                <a16:creationId xmlns:a16="http://schemas.microsoft.com/office/drawing/2014/main" id="{77A4B0E6-B56D-0044-B34A-AC97ED2A9663}"/>
+              </a:ext>
+            </a:extLst>
+          </p:cNvPr>
+          <p:cNvSpPr>
+            <a:spLocks noChangeAspect="1"/>
+          </p:cNvSpPr>
+          <p:nvPr/>
+        </p:nvSpPr>
+        <p:spPr>
+          <a:xfrm>
+            <a:off x="25980418" y="20519898"/>
+            <a:ext cx="228600" cy="228600"/>
+          </a:xfrm>
+          <a:prstGeom prst="ellipse">
+            <a:avLst/>
+          </a:prstGeom>
+          <a:solidFill>
+            <a:srgbClr val="0F01FF"/>
+          </a:solidFill>
+          <a:ln>
+            <a:solidFill>
+              <a:schemeClr val="tx1"/>
+            </a:solidFill>
+          </a:ln>
+        </p:spPr>
+        <p:style>
+          <a:lnRef idx="2">
+            <a:schemeClr val="accent1">
+              <a:shade val="15000"/>
+            </a:schemeClr>
+          </a:lnRef>
+          <a:fillRef idx="1">
+            <a:schemeClr val="accent1"/>
+          </a:fillRef>
+          <a:effectRef idx="0">
+            <a:schemeClr val="accent1"/>
+          </a:effectRef>
+          <a:fontRef idx="minor">
+            <a:schemeClr val="lt1"/>
+          </a:fontRef>
+        </p:style>
+        <p:txBody>
+          <a:bodyPr rtlCol="0" anchor="ctr"/>
+          <a:lstStyle/>
+          <a:p>
+            <a:pPr algn="ctr"/>
+            <a:endParaRPr lang="en-US"/>
+          </a:p>
+        </p:txBody>
+      </p:sp>
+      <p:sp>
+        <p:nvSpPr>
+          <p:cNvPr id="39" name="Oval 38">
+            <a:extLst>
+              <a:ext uri="{FF2B5EF4-FFF2-40B4-BE49-F238E27FC236}">
+                <a16:creationId xmlns:a16="http://schemas.microsoft.com/office/drawing/2014/main" id="{C0C8D7DD-FCDF-51E8-1DC6-86BAB9D025FA}"/>
+              </a:ext>
+            </a:extLst>
+          </p:cNvPr>
+          <p:cNvSpPr>
+            <a:spLocks noChangeAspect="1"/>
+          </p:cNvSpPr>
+          <p:nvPr/>
+        </p:nvSpPr>
+        <p:spPr>
+          <a:xfrm>
+            <a:off x="26123505" y="20845778"/>
+            <a:ext cx="228600" cy="228600"/>
+          </a:xfrm>
+          <a:prstGeom prst="ellipse">
+            <a:avLst/>
+          </a:prstGeom>
+          <a:solidFill>
+            <a:srgbClr val="FF0900"/>
+          </a:solidFill>
+          <a:ln>
+            <a:solidFill>
+              <a:schemeClr val="tx1"/>
+            </a:solidFill>
+          </a:ln>
+        </p:spPr>
+        <p:style>
+          <a:lnRef idx="2">
+            <a:schemeClr val="accent1">
+              <a:shade val="15000"/>
+            </a:schemeClr>
+          </a:lnRef>
+          <a:fillRef idx="1">
+            <a:schemeClr val="accent1"/>
+          </a:fillRef>
+          <a:effectRef idx="0">
+            <a:schemeClr val="accent1"/>
+          </a:effectRef>
+          <a:fontRef idx="minor">
+            <a:schemeClr val="lt1"/>
+          </a:fontRef>
+        </p:style>
+        <p:txBody>
+          <a:bodyPr rtlCol="0" anchor="ctr"/>
+          <a:lstStyle/>
+          <a:p>
+            <a:pPr algn="ctr"/>
+            <a:endParaRPr lang="en-US"/>
+          </a:p>
+        </p:txBody>
+      </p:sp>
+      <p:sp>
+        <p:nvSpPr>
+          <p:cNvPr id="1027" name="Oval 1026">
+            <a:extLst>
+              <a:ext uri="{FF2B5EF4-FFF2-40B4-BE49-F238E27FC236}">
+                <a16:creationId xmlns:a16="http://schemas.microsoft.com/office/drawing/2014/main" id="{6D84AA70-7A19-5F38-4C65-59C97ECD91C2}"/>
+              </a:ext>
+            </a:extLst>
+          </p:cNvPr>
+          <p:cNvSpPr>
+            <a:spLocks noChangeAspect="1"/>
+          </p:cNvSpPr>
+          <p:nvPr/>
+        </p:nvSpPr>
+        <p:spPr>
+          <a:xfrm>
+            <a:off x="25999924" y="21170033"/>
+            <a:ext cx="228600" cy="228600"/>
+          </a:xfrm>
+          <a:prstGeom prst="ellipse">
+            <a:avLst/>
+          </a:prstGeom>
+          <a:solidFill>
+            <a:srgbClr val="FF0900"/>
+          </a:solidFill>
+          <a:ln>
+            <a:solidFill>
+              <a:schemeClr val="tx1"/>
+            </a:solidFill>
+          </a:ln>
+        </p:spPr>
+        <p:style>
+          <a:lnRef idx="2">
+            <a:schemeClr val="accent1">
+              <a:shade val="15000"/>
+            </a:schemeClr>
+          </a:lnRef>
+          <a:fillRef idx="1">
+            <a:schemeClr val="accent1"/>
+          </a:fillRef>
+          <a:effectRef idx="0">
+            <a:schemeClr val="accent1"/>
+          </a:effectRef>
+          <a:fontRef idx="minor">
+            <a:schemeClr val="lt1"/>
+          </a:fontRef>
+        </p:style>
+        <p:txBody>
+          <a:bodyPr rtlCol="0" anchor="ctr"/>
+          <a:lstStyle/>
+          <a:p>
+            <a:pPr algn="ctr"/>
+            <a:endParaRPr lang="en-US"/>
+          </a:p>
+        </p:txBody>
+      </p:sp>
+      <p:sp>
+        <p:nvSpPr>
+          <p:cNvPr id="1048" name="Oval 1047">
+            <a:extLst>
+              <a:ext uri="{FF2B5EF4-FFF2-40B4-BE49-F238E27FC236}">
+                <a16:creationId xmlns:a16="http://schemas.microsoft.com/office/drawing/2014/main" id="{3EB4E4F8-EFCF-08A2-E73C-39653C392458}"/>
+              </a:ext>
+            </a:extLst>
+          </p:cNvPr>
+          <p:cNvSpPr>
+            <a:spLocks noChangeAspect="1"/>
+          </p:cNvSpPr>
+          <p:nvPr/>
+        </p:nvSpPr>
+        <p:spPr>
+          <a:xfrm>
+            <a:off x="26131058" y="21492561"/>
+            <a:ext cx="228600" cy="228600"/>
+          </a:xfrm>
+          <a:prstGeom prst="ellipse">
+            <a:avLst/>
+          </a:prstGeom>
+          <a:solidFill>
+            <a:srgbClr val="FF0900"/>
+          </a:solidFill>
+          <a:ln>
+            <a:solidFill>
+              <a:schemeClr val="tx1"/>
+            </a:solidFill>
+          </a:ln>
+        </p:spPr>
+        <p:style>
+          <a:lnRef idx="2">
+            <a:schemeClr val="accent1">
+              <a:shade val="15000"/>
+            </a:schemeClr>
+          </a:lnRef>
+          <a:fillRef idx="1">
+            <a:schemeClr val="accent1"/>
+          </a:fillRef>
+          <a:effectRef idx="0">
+            <a:schemeClr val="accent1"/>
+          </a:effectRef>
+          <a:fontRef idx="minor">
+            <a:schemeClr val="lt1"/>
+          </a:fontRef>
+        </p:style>
+        <p:txBody>
+          <a:bodyPr rtlCol="0" anchor="ctr"/>
+          <a:lstStyle/>
+          <a:p>
+            <a:pPr algn="ctr"/>
+            <a:endParaRPr lang="en-US"/>
+          </a:p>
+        </p:txBody>
+      </p:sp>
+      <p:sp>
+        <p:nvSpPr>
+          <p:cNvPr id="1050" name="Oval 1049">
+            <a:extLst>
+              <a:ext uri="{FF2B5EF4-FFF2-40B4-BE49-F238E27FC236}">
+                <a16:creationId xmlns:a16="http://schemas.microsoft.com/office/drawing/2014/main" id="{D9B59387-48BA-F9E3-44E2-7AE6D32AF625}"/>
+              </a:ext>
+            </a:extLst>
+          </p:cNvPr>
+          <p:cNvSpPr>
+            <a:spLocks noChangeAspect="1"/>
+          </p:cNvSpPr>
+          <p:nvPr/>
+        </p:nvSpPr>
+        <p:spPr>
+          <a:xfrm>
+            <a:off x="24765644" y="21837208"/>
+            <a:ext cx="228600" cy="228600"/>
+          </a:xfrm>
+          <a:prstGeom prst="ellipse">
+            <a:avLst/>
+          </a:prstGeom>
+          <a:solidFill>
+            <a:srgbClr val="FF0900"/>
+          </a:solidFill>
+          <a:ln>
+            <a:solidFill>
+              <a:schemeClr val="tx1"/>
+            </a:solidFill>
+          </a:ln>
+        </p:spPr>
+        <p:style>
+          <a:lnRef idx="2">
+            <a:schemeClr val="accent1">
+              <a:shade val="15000"/>
+            </a:schemeClr>
+          </a:lnRef>
+          <a:fillRef idx="1">
+            <a:schemeClr val="accent1"/>
+          </a:fillRef>
+          <a:effectRef idx="0">
+            <a:schemeClr val="accent1"/>
+          </a:effectRef>
+          <a:fontRef idx="minor">
+            <a:schemeClr val="lt1"/>
+          </a:fontRef>
+        </p:style>
+        <p:txBody>
+          <a:bodyPr rtlCol="0" anchor="ctr"/>
+          <a:lstStyle/>
+          <a:p>
+            <a:pPr algn="ctr"/>
+            <a:endParaRPr lang="en-US"/>
+          </a:p>
+        </p:txBody>
+      </p:sp>
+      <p:sp>
+        <p:nvSpPr>
+          <p:cNvPr id="1051" name="Oval 1050">
+            <a:extLst>
+              <a:ext uri="{FF2B5EF4-FFF2-40B4-BE49-F238E27FC236}">
+                <a16:creationId xmlns:a16="http://schemas.microsoft.com/office/drawing/2014/main" id="{97A51752-AD5A-0665-C487-A1800E9AC317}"/>
+              </a:ext>
+            </a:extLst>
+          </p:cNvPr>
+          <p:cNvSpPr>
+            <a:spLocks noChangeAspect="1"/>
+          </p:cNvSpPr>
+          <p:nvPr/>
+        </p:nvSpPr>
+        <p:spPr>
+          <a:xfrm>
+            <a:off x="25402858" y="22146032"/>
+            <a:ext cx="228600" cy="228600"/>
+          </a:xfrm>
+          <a:prstGeom prst="ellipse">
+            <a:avLst/>
+          </a:prstGeom>
+          <a:solidFill>
+            <a:srgbClr val="FF0900"/>
+          </a:solidFill>
+          <a:ln>
+            <a:solidFill>
+              <a:schemeClr val="tx1"/>
+            </a:solidFill>
+          </a:ln>
+        </p:spPr>
+        <p:style>
+          <a:lnRef idx="2">
+            <a:schemeClr val="accent1">
+              <a:shade val="15000"/>
+            </a:schemeClr>
+          </a:lnRef>
+          <a:fillRef idx="1">
+            <a:schemeClr val="accent1"/>
+          </a:fillRef>
+          <a:effectRef idx="0">
+            <a:schemeClr val="accent1"/>
+          </a:effectRef>
+          <a:fontRef idx="minor">
+            <a:schemeClr val="lt1"/>
+          </a:fontRef>
+        </p:style>
+        <p:txBody>
+          <a:bodyPr rtlCol="0" anchor="ctr"/>
+          <a:lstStyle/>
+          <a:p>
+            <a:pPr algn="ctr"/>
+            <a:endParaRPr lang="en-US"/>
+          </a:p>
+        </p:txBody>
+      </p:sp>
+      <p:sp>
+        <p:nvSpPr>
+          <p:cNvPr id="1052" name="Oval 1051">
+            <a:extLst>
+              <a:ext uri="{FF2B5EF4-FFF2-40B4-BE49-F238E27FC236}">
+                <a16:creationId xmlns:a16="http://schemas.microsoft.com/office/drawing/2014/main" id="{94033C18-6A72-AC41-3368-2E4B5A8C1E96}"/>
+              </a:ext>
+            </a:extLst>
+          </p:cNvPr>
+          <p:cNvSpPr>
+            <a:spLocks noChangeAspect="1"/>
+          </p:cNvSpPr>
+          <p:nvPr/>
+        </p:nvSpPr>
+        <p:spPr>
+          <a:xfrm>
+            <a:off x="26100747" y="22474531"/>
+            <a:ext cx="228600" cy="228600"/>
+          </a:xfrm>
+          <a:prstGeom prst="ellipse">
+            <a:avLst/>
+          </a:prstGeom>
+          <a:solidFill>
+            <a:srgbClr val="FF0900"/>
+          </a:solidFill>
+          <a:ln>
+            <a:solidFill>
+              <a:schemeClr val="tx1"/>
+            </a:solidFill>
+          </a:ln>
+        </p:spPr>
+        <p:style>
+          <a:lnRef idx="2">
+            <a:schemeClr val="accent1">
+              <a:shade val="15000"/>
+            </a:schemeClr>
+          </a:lnRef>
+          <a:fillRef idx="1">
+            <a:schemeClr val="accent1"/>
+          </a:fillRef>
+          <a:effectRef idx="0">
+            <a:schemeClr val="accent1"/>
+          </a:effectRef>
+          <a:fontRef idx="minor">
+            <a:schemeClr val="lt1"/>
+          </a:fontRef>
+        </p:style>
+        <p:txBody>
+          <a:bodyPr rtlCol="0" anchor="ctr"/>
+          <a:lstStyle/>
+          <a:p>
+            <a:pPr algn="ctr"/>
+            <a:endParaRPr lang="en-US"/>
+          </a:p>
+        </p:txBody>
+      </p:sp>
+      <p:sp>
+        <p:nvSpPr>
+          <p:cNvPr id="1054" name="Oval 1053">
+            <a:extLst>
+              <a:ext uri="{FF2B5EF4-FFF2-40B4-BE49-F238E27FC236}">
+                <a16:creationId xmlns:a16="http://schemas.microsoft.com/office/drawing/2014/main" id="{29F0411E-5C50-7F39-8AFA-B8673F40CCDF}"/>
+              </a:ext>
+            </a:extLst>
+          </p:cNvPr>
+          <p:cNvSpPr>
+            <a:spLocks noChangeAspect="1"/>
+          </p:cNvSpPr>
+          <p:nvPr/>
+        </p:nvSpPr>
+        <p:spPr>
+          <a:xfrm>
+            <a:off x="25898017" y="22819006"/>
+            <a:ext cx="228600" cy="228600"/>
+          </a:xfrm>
+          <a:prstGeom prst="ellipse">
+            <a:avLst/>
+          </a:prstGeom>
+          <a:solidFill>
+            <a:srgbClr val="0F01FF"/>
+          </a:solidFill>
+          <a:ln>
+            <a:solidFill>
+              <a:schemeClr val="tx1"/>
+            </a:solidFill>
+          </a:ln>
+        </p:spPr>
+        <p:style>
+          <a:lnRef idx="2">
+            <a:schemeClr val="accent1">
+              <a:shade val="15000"/>
+            </a:schemeClr>
+          </a:lnRef>
+          <a:fillRef idx="1">
+            <a:schemeClr val="accent1"/>
+          </a:fillRef>
+          <a:effectRef idx="0">
+            <a:schemeClr val="accent1"/>
+          </a:effectRef>
+          <a:fontRef idx="minor">
+            <a:schemeClr val="lt1"/>
+          </a:fontRef>
+        </p:style>
+        <p:txBody>
+          <a:bodyPr rtlCol="0" anchor="ctr"/>
+          <a:lstStyle/>
+          <a:p>
+            <a:pPr algn="ctr"/>
+            <a:endParaRPr lang="en-US"/>
+          </a:p>
+        </p:txBody>
+      </p:sp>
+      <p:sp>
+        <p:nvSpPr>
+          <p:cNvPr id="1059" name="Oval 1058">
+            <a:extLst>
+              <a:ext uri="{FF2B5EF4-FFF2-40B4-BE49-F238E27FC236}">
+                <a16:creationId xmlns:a16="http://schemas.microsoft.com/office/drawing/2014/main" id="{77F9B1C3-8A8B-4BC4-EC93-3D7D5A9949EF}"/>
+              </a:ext>
+            </a:extLst>
+          </p:cNvPr>
+          <p:cNvSpPr>
+            <a:spLocks noChangeAspect="1"/>
+          </p:cNvSpPr>
+          <p:nvPr/>
+        </p:nvSpPr>
+        <p:spPr>
+          <a:xfrm>
+            <a:off x="26826125" y="23150672"/>
+            <a:ext cx="228600" cy="228600"/>
+          </a:xfrm>
+          <a:prstGeom prst="ellipse">
+            <a:avLst/>
+          </a:prstGeom>
+          <a:solidFill>
+            <a:srgbClr val="0F01FF"/>
+          </a:solidFill>
+          <a:ln>
+            <a:solidFill>
+              <a:schemeClr val="tx1"/>
+            </a:solidFill>
+          </a:ln>
+        </p:spPr>
+        <p:style>
+          <a:lnRef idx="2">
+            <a:schemeClr val="accent1">
+              <a:shade val="15000"/>
+            </a:schemeClr>
+          </a:lnRef>
+          <a:fillRef idx="1">
+            <a:schemeClr val="accent1"/>
+          </a:fillRef>
+          <a:effectRef idx="0">
+            <a:schemeClr val="accent1"/>
+          </a:effectRef>
+          <a:fontRef idx="minor">
+            <a:schemeClr val="lt1"/>
+          </a:fontRef>
+        </p:style>
+        <p:txBody>
+          <a:bodyPr rtlCol="0" anchor="ctr"/>
+          <a:lstStyle/>
+          <a:p>
+            <a:pPr algn="ctr"/>
+            <a:endParaRPr lang="en-US"/>
+          </a:p>
+        </p:txBody>
+      </p:sp>
+      <p:sp>
+        <p:nvSpPr>
+          <p:cNvPr id="1061" name="Oval 1060">
+            <a:extLst>
+              <a:ext uri="{FF2B5EF4-FFF2-40B4-BE49-F238E27FC236}">
+                <a16:creationId xmlns:a16="http://schemas.microsoft.com/office/drawing/2014/main" id="{B6C230F7-31C0-A912-5387-98999C145C6C}"/>
+              </a:ext>
+            </a:extLst>
+          </p:cNvPr>
+          <p:cNvSpPr>
+            <a:spLocks noChangeAspect="1"/>
+          </p:cNvSpPr>
+          <p:nvPr/>
+        </p:nvSpPr>
+        <p:spPr>
+          <a:xfrm>
+            <a:off x="26080570" y="23452106"/>
+            <a:ext cx="228600" cy="228600"/>
+          </a:xfrm>
+          <a:prstGeom prst="ellipse">
+            <a:avLst/>
+          </a:prstGeom>
+          <a:solidFill>
+            <a:srgbClr val="0F01FF"/>
+          </a:solidFill>
+          <a:ln>
+            <a:solidFill>
+              <a:schemeClr val="tx1"/>
+            </a:solidFill>
+          </a:ln>
+        </p:spPr>
+        <p:style>
+          <a:lnRef idx="2">
+            <a:schemeClr val="accent1">
+              <a:shade val="15000"/>
+            </a:schemeClr>
+          </a:lnRef>
+          <a:fillRef idx="1">
+            <a:schemeClr val="accent1"/>
+          </a:fillRef>
+          <a:effectRef idx="0">
+            <a:schemeClr val="accent1"/>
+          </a:effectRef>
+          <a:fontRef idx="minor">
+            <a:schemeClr val="lt1"/>
+          </a:fontRef>
+        </p:style>
+        <p:txBody>
+          <a:bodyPr rtlCol="0" anchor="ctr"/>
+          <a:lstStyle/>
+          <a:p>
+            <a:pPr algn="ctr"/>
+            <a:endParaRPr lang="en-US"/>
+          </a:p>
+        </p:txBody>
+      </p:sp>
+      <p:sp>
+        <p:nvSpPr>
+          <p:cNvPr id="1067" name="Oval 1066">
+            <a:extLst>
+              <a:ext uri="{FF2B5EF4-FFF2-40B4-BE49-F238E27FC236}">
+                <a16:creationId xmlns:a16="http://schemas.microsoft.com/office/drawing/2014/main" id="{96B8CFF2-9618-F326-E641-2F61D79439BC}"/>
+              </a:ext>
+            </a:extLst>
+          </p:cNvPr>
+          <p:cNvSpPr>
+            <a:spLocks noChangeAspect="1"/>
+          </p:cNvSpPr>
+          <p:nvPr/>
+        </p:nvSpPr>
+        <p:spPr>
+          <a:xfrm>
+            <a:off x="25885624" y="23779029"/>
+            <a:ext cx="228600" cy="228600"/>
+          </a:xfrm>
+          <a:prstGeom prst="ellipse">
+            <a:avLst/>
+          </a:prstGeom>
+          <a:solidFill>
+            <a:srgbClr val="FF0900"/>
+          </a:solidFill>
+          <a:ln>
+            <a:solidFill>
+              <a:schemeClr val="tx1"/>
+            </a:solidFill>
+          </a:ln>
+        </p:spPr>
+        <p:style>
+          <a:lnRef idx="2">
+            <a:schemeClr val="accent1">
+              <a:shade val="15000"/>
+            </a:schemeClr>
+          </a:lnRef>
+          <a:fillRef idx="1">
+            <a:schemeClr val="accent1"/>
+          </a:fillRef>
+          <a:effectRef idx="0">
+            <a:schemeClr val="accent1"/>
+          </a:effectRef>
+          <a:fontRef idx="minor">
+            <a:schemeClr val="lt1"/>
+          </a:fontRef>
+        </p:style>
+        <p:txBody>
+          <a:bodyPr rtlCol="0" anchor="ctr"/>
+          <a:lstStyle/>
+          <a:p>
+            <a:pPr algn="ctr"/>
+            <a:endParaRPr lang="en-US"/>
+          </a:p>
+        </p:txBody>
+      </p:sp>
+      <p:sp>
+        <p:nvSpPr>
+          <p:cNvPr id="1068" name="Oval 1067">
+            <a:extLst>
+              <a:ext uri="{FF2B5EF4-FFF2-40B4-BE49-F238E27FC236}">
+                <a16:creationId xmlns:a16="http://schemas.microsoft.com/office/drawing/2014/main" id="{EDD1FC50-927F-44B5-D94F-9AF7F86095F1}"/>
+              </a:ext>
+            </a:extLst>
+          </p:cNvPr>
+          <p:cNvSpPr>
+            <a:spLocks noChangeAspect="1"/>
+          </p:cNvSpPr>
+          <p:nvPr/>
+        </p:nvSpPr>
+        <p:spPr>
+          <a:xfrm>
+            <a:off x="26554954" y="24121818"/>
+            <a:ext cx="228600" cy="228600"/>
+          </a:xfrm>
+          <a:prstGeom prst="ellipse">
+            <a:avLst/>
+          </a:prstGeom>
+          <a:solidFill>
+            <a:srgbClr val="0F01FF"/>
+          </a:solidFill>
+          <a:ln>
+            <a:solidFill>
+              <a:schemeClr val="tx1"/>
+            </a:solidFill>
+          </a:ln>
+        </p:spPr>
+        <p:style>
+          <a:lnRef idx="2">
+            <a:schemeClr val="accent1">
+              <a:shade val="15000"/>
+            </a:schemeClr>
+          </a:lnRef>
+          <a:fillRef idx="1">
+            <a:schemeClr val="accent1"/>
+          </a:fillRef>
+          <a:effectRef idx="0">
+            <a:schemeClr val="accent1"/>
+          </a:effectRef>
+          <a:fontRef idx="minor">
+            <a:schemeClr val="lt1"/>
+          </a:fontRef>
+        </p:style>
+        <p:txBody>
+          <a:bodyPr rtlCol="0" anchor="ctr"/>
+          <a:lstStyle/>
+          <a:p>
+            <a:pPr algn="ctr"/>
+            <a:endParaRPr lang="en-US"/>
+          </a:p>
+        </p:txBody>
+      </p:sp>
+      <p:sp>
+        <p:nvSpPr>
+          <p:cNvPr id="1069" name="Oval 1068">
+            <a:extLst>
+              <a:ext uri="{FF2B5EF4-FFF2-40B4-BE49-F238E27FC236}">
+                <a16:creationId xmlns:a16="http://schemas.microsoft.com/office/drawing/2014/main" id="{BA02B8B7-CC93-63DF-FC38-5FCF926AA8E8}"/>
+              </a:ext>
+            </a:extLst>
+          </p:cNvPr>
+          <p:cNvSpPr>
+            <a:spLocks noChangeAspect="1"/>
+          </p:cNvSpPr>
+          <p:nvPr/>
+        </p:nvSpPr>
+        <p:spPr>
+          <a:xfrm>
+            <a:off x="25820071" y="24448288"/>
+            <a:ext cx="228600" cy="228600"/>
+          </a:xfrm>
+          <a:prstGeom prst="ellipse">
+            <a:avLst/>
+          </a:prstGeom>
+          <a:solidFill>
+            <a:srgbClr val="0F01FF"/>
+          </a:solidFill>
+          <a:ln>
+            <a:solidFill>
+              <a:schemeClr val="tx1"/>
+            </a:solidFill>
+          </a:ln>
+        </p:spPr>
+        <p:style>
+          <a:lnRef idx="2">
+            <a:schemeClr val="accent1">
+              <a:shade val="15000"/>
+            </a:schemeClr>
+          </a:lnRef>
+          <a:fillRef idx="1">
+            <a:schemeClr val="accent1"/>
+          </a:fillRef>
+          <a:effectRef idx="0">
+            <a:schemeClr val="accent1"/>
+          </a:effectRef>
+          <a:fontRef idx="minor">
+            <a:schemeClr val="lt1"/>
+          </a:fontRef>
+        </p:style>
+        <p:txBody>
+          <a:bodyPr rtlCol="0" anchor="ctr"/>
+          <a:lstStyle/>
+          <a:p>
+            <a:pPr algn="ctr"/>
+            <a:endParaRPr lang="en-US"/>
+          </a:p>
+        </p:txBody>
+      </p:sp>
     </p:spTree>
     <p:extLst>
       <p:ext uri="{BB962C8B-B14F-4D97-AF65-F5344CB8AC3E}">

</xml_diff>

<commit_message>
Poster Updates via Avi
</commit_message>
<xml_diff>
--- a/assets/CSHL_PPT_Poster_V2.pptx
+++ b/assets/CSHL_PPT_Poster_V2.pptx
@@ -128,12 +128,12 @@
   <pc:docChgLst>
     <pc:chgData name="McCauley, Kathryn (NIH/NIAID) [C]" userId="8123e298-eaa7-4067-960e-8e9acda1581f" providerId="ADAL" clId="{0C402FB5-1208-C94F-B091-6134B46BEC84}"/>
     <pc:docChg chg="undo custSel modSld">
-      <pc:chgData name="McCauley, Kathryn (NIH/NIAID) [C]" userId="8123e298-eaa7-4067-960e-8e9acda1581f" providerId="ADAL" clId="{0C402FB5-1208-C94F-B091-6134B46BEC84}" dt="2024-10-23T13:39:32.280" v="2428" actId="20577"/>
+      <pc:chgData name="McCauley, Kathryn (NIH/NIAID) [C]" userId="8123e298-eaa7-4067-960e-8e9acda1581f" providerId="ADAL" clId="{0C402FB5-1208-C94F-B091-6134B46BEC84}" dt="2024-10-24T13:43:56.863" v="2505" actId="208"/>
       <pc:docMkLst>
         <pc:docMk/>
       </pc:docMkLst>
       <pc:sldChg chg="addSp modSp mod">
-        <pc:chgData name="McCauley, Kathryn (NIH/NIAID) [C]" userId="8123e298-eaa7-4067-960e-8e9acda1581f" providerId="ADAL" clId="{0C402FB5-1208-C94F-B091-6134B46BEC84}" dt="2024-10-23T13:39:32.280" v="2428" actId="20577"/>
+        <pc:chgData name="McCauley, Kathryn (NIH/NIAID) [C]" userId="8123e298-eaa7-4067-960e-8e9acda1581f" providerId="ADAL" clId="{0C402FB5-1208-C94F-B091-6134B46BEC84}" dt="2024-10-24T13:43:56.863" v="2505" actId="208"/>
         <pc:sldMkLst>
           <pc:docMk/>
           <pc:sldMk cId="1538252808" sldId="257"/>
@@ -464,6 +464,14 @@
             <pc:docMk/>
             <pc:sldMk cId="1538252808" sldId="257"/>
             <ac:spMk id="1033" creationId="{E4445685-F59B-C83F-5687-D4DA7C4BEF5F}"/>
+          </ac:spMkLst>
+        </pc:spChg>
+        <pc:spChg chg="mod">
+          <ac:chgData name="McCauley, Kathryn (NIH/NIAID) [C]" userId="8123e298-eaa7-4067-960e-8e9acda1581f" providerId="ADAL" clId="{0C402FB5-1208-C94F-B091-6134B46BEC84}" dt="2024-10-24T13:42:28.437" v="2503" actId="20577"/>
+          <ac:spMkLst>
+            <pc:docMk/>
+            <pc:sldMk cId="1538252808" sldId="257"/>
+            <ac:spMk id="1034" creationId="{EAEE6457-6B12-F117-48AB-67C3D44F5EEE}"/>
           </ac:spMkLst>
         </pc:spChg>
         <pc:spChg chg="mod">
@@ -915,6 +923,22 @@
           </ac:picMkLst>
         </pc:picChg>
         <pc:cxnChg chg="mod">
+          <ac:chgData name="McCauley, Kathryn (NIH/NIAID) [C]" userId="8123e298-eaa7-4067-960e-8e9acda1581f" providerId="ADAL" clId="{0C402FB5-1208-C94F-B091-6134B46BEC84}" dt="2024-10-24T13:43:56.863" v="2505" actId="208"/>
+          <ac:cxnSpMkLst>
+            <pc:docMk/>
+            <pc:sldMk cId="1538252808" sldId="257"/>
+            <ac:cxnSpMk id="11" creationId="{D7336E74-C7DD-554B-F2A4-E5A42930AC10}"/>
+          </ac:cxnSpMkLst>
+        </pc:cxnChg>
+        <pc:cxnChg chg="mod">
+          <ac:chgData name="McCauley, Kathryn (NIH/NIAID) [C]" userId="8123e298-eaa7-4067-960e-8e9acda1581f" providerId="ADAL" clId="{0C402FB5-1208-C94F-B091-6134B46BEC84}" dt="2024-10-24T13:43:54.077" v="2504" actId="208"/>
+          <ac:cxnSpMkLst>
+            <pc:docMk/>
+            <pc:sldMk cId="1538252808" sldId="257"/>
+            <ac:cxnSpMk id="15" creationId="{2BA4C0FB-B0EC-F718-4D67-B3F733956AA8}"/>
+          </ac:cxnSpMkLst>
+        </pc:cxnChg>
+        <pc:cxnChg chg="mod">
           <ac:chgData name="McCauley, Kathryn (NIH/NIAID) [C]" userId="8123e298-eaa7-4067-960e-8e9acda1581f" providerId="ADAL" clId="{0C402FB5-1208-C94F-B091-6134B46BEC84}" dt="2024-10-23T13:37:28.768" v="2386" actId="1037"/>
           <ac:cxnSpMkLst>
             <pc:docMk/>
@@ -1026,7 +1050,7 @@
           <a:p>
             <a:fld id="{23FB4B41-4CCE-9541-B1BD-AD7E0745DD20}" type="datetimeFigureOut">
               <a:rPr lang="en-US" smtClean="0"/>
-              <a:t>10/23/24</a:t>
+              <a:t>10/24/24</a:t>
             </a:fld>
             <a:endParaRPr lang="en-US"/>
           </a:p>
@@ -1508,7 +1532,7 @@
           <a:p>
             <a:fld id="{DDCDFDCF-5B5E-9D4E-AA60-E7B60AA046F2}" type="datetimeFigureOut">
               <a:rPr lang="en-US" smtClean="0"/>
-              <a:t>10/23/24</a:t>
+              <a:t>10/24/24</a:t>
             </a:fld>
             <a:endParaRPr lang="en-US"/>
           </a:p>
@@ -1678,7 +1702,7 @@
           <a:p>
             <a:fld id="{DDCDFDCF-5B5E-9D4E-AA60-E7B60AA046F2}" type="datetimeFigureOut">
               <a:rPr lang="en-US" smtClean="0"/>
-              <a:t>10/23/24</a:t>
+              <a:t>10/24/24</a:t>
             </a:fld>
             <a:endParaRPr lang="en-US"/>
           </a:p>
@@ -1858,7 +1882,7 @@
           <a:p>
             <a:fld id="{DDCDFDCF-5B5E-9D4E-AA60-E7B60AA046F2}" type="datetimeFigureOut">
               <a:rPr lang="en-US" smtClean="0"/>
-              <a:t>10/23/24</a:t>
+              <a:t>10/24/24</a:t>
             </a:fld>
             <a:endParaRPr lang="en-US"/>
           </a:p>
@@ -2028,7 +2052,7 @@
           <a:p>
             <a:fld id="{DDCDFDCF-5B5E-9D4E-AA60-E7B60AA046F2}" type="datetimeFigureOut">
               <a:rPr lang="en-US" smtClean="0"/>
-              <a:t>10/23/24</a:t>
+              <a:t>10/24/24</a:t>
             </a:fld>
             <a:endParaRPr lang="en-US"/>
           </a:p>
@@ -2274,7 +2298,7 @@
           <a:p>
             <a:fld id="{DDCDFDCF-5B5E-9D4E-AA60-E7B60AA046F2}" type="datetimeFigureOut">
               <a:rPr lang="en-US" smtClean="0"/>
-              <a:t>10/23/24</a:t>
+              <a:t>10/24/24</a:t>
             </a:fld>
             <a:endParaRPr lang="en-US"/>
           </a:p>
@@ -2506,7 +2530,7 @@
           <a:p>
             <a:fld id="{DDCDFDCF-5B5E-9D4E-AA60-E7B60AA046F2}" type="datetimeFigureOut">
               <a:rPr lang="en-US" smtClean="0"/>
-              <a:t>10/23/24</a:t>
+              <a:t>10/24/24</a:t>
             </a:fld>
             <a:endParaRPr lang="en-US"/>
           </a:p>
@@ -2873,7 +2897,7 @@
           <a:p>
             <a:fld id="{DDCDFDCF-5B5E-9D4E-AA60-E7B60AA046F2}" type="datetimeFigureOut">
               <a:rPr lang="en-US" smtClean="0"/>
-              <a:t>10/23/24</a:t>
+              <a:t>10/24/24</a:t>
             </a:fld>
             <a:endParaRPr lang="en-US"/>
           </a:p>
@@ -2991,7 +3015,7 @@
           <a:p>
             <a:fld id="{DDCDFDCF-5B5E-9D4E-AA60-E7B60AA046F2}" type="datetimeFigureOut">
               <a:rPr lang="en-US" smtClean="0"/>
-              <a:t>10/23/24</a:t>
+              <a:t>10/24/24</a:t>
             </a:fld>
             <a:endParaRPr lang="en-US"/>
           </a:p>
@@ -3086,7 +3110,7 @@
           <a:p>
             <a:fld id="{DDCDFDCF-5B5E-9D4E-AA60-E7B60AA046F2}" type="datetimeFigureOut">
               <a:rPr lang="en-US" smtClean="0"/>
-              <a:t>10/23/24</a:t>
+              <a:t>10/24/24</a:t>
             </a:fld>
             <a:endParaRPr lang="en-US"/>
           </a:p>
@@ -3363,7 +3387,7 @@
           <a:p>
             <a:fld id="{DDCDFDCF-5B5E-9D4E-AA60-E7B60AA046F2}" type="datetimeFigureOut">
               <a:rPr lang="en-US" smtClean="0"/>
-              <a:t>10/23/24</a:t>
+              <a:t>10/24/24</a:t>
             </a:fld>
             <a:endParaRPr lang="en-US"/>
           </a:p>
@@ -3620,7 +3644,7 @@
           <a:p>
             <a:fld id="{DDCDFDCF-5B5E-9D4E-AA60-E7B60AA046F2}" type="datetimeFigureOut">
               <a:rPr lang="en-US" smtClean="0"/>
-              <a:t>10/23/24</a:t>
+              <a:t>10/24/24</a:t>
             </a:fld>
             <a:endParaRPr lang="en-US"/>
           </a:p>
@@ -3833,7 +3857,7 @@
           <a:p>
             <a:fld id="{DDCDFDCF-5B5E-9D4E-AA60-E7B60AA046F2}" type="datetimeFigureOut">
               <a:rPr lang="en-US" smtClean="0"/>
-              <a:t>10/23/24</a:t>
+              <a:t>10/24/24</a:t>
             </a:fld>
             <a:endParaRPr lang="en-US"/>
           </a:p>
@@ -7132,8 +7156,8 @@
         </p:nvSpPr>
         <p:spPr>
           <a:xfrm>
-            <a:off x="24048053" y="17522521"/>
-            <a:ext cx="14335592" cy="1446550"/>
+            <a:off x="24733853" y="17476801"/>
+            <a:ext cx="13795175" cy="1446550"/>
           </a:xfrm>
           <a:prstGeom prst="rect">
             <a:avLst/>
@@ -7153,7 +7177,7 @@
                 <a:ea typeface="Roboto" panose="02000000000000000000" pitchFamily="2" charset="0"/>
                 <a:cs typeface="Roboto" panose="02000000000000000000" pitchFamily="2" charset="0"/>
               </a:rPr>
-              <a:t>Bacteria With Differential Translocation Have Nominally Higher </a:t>
+              <a:t>Bacteria With Differential Translocation Exhibit Nominally Lower </a:t>
             </a:r>
             <a:r>
               <a:rPr lang="en-US" sz="4400" b="1" dirty="0">
@@ -7161,7 +7185,7 @@
                 <a:ea typeface="Roboto" panose="02000000000000000000" pitchFamily="2" charset="0"/>
                 <a:cs typeface="Roboto" panose="02000000000000000000" pitchFamily="2" charset="0"/>
               </a:rPr>
-              <a:t>Metabolic Activity </a:t>
+              <a:t>Growth Rates </a:t>
             </a:r>
             <a:r>
               <a:rPr lang="en-US" sz="4400" dirty="0">
@@ -7169,7 +7193,7 @@
                 <a:ea typeface="Roboto" panose="02000000000000000000" pitchFamily="2" charset="0"/>
                 <a:cs typeface="Roboto" panose="02000000000000000000" pitchFamily="2" charset="0"/>
               </a:rPr>
-              <a:t>in Healthy Volunteers</a:t>
+              <a:t>in PI-ME/CFS</a:t>
             </a:r>
           </a:p>
         </p:txBody>
@@ -9522,6 +9546,9 @@
             <a:avLst/>
           </a:prstGeom>
           <a:ln>
+            <a:solidFill>
+              <a:schemeClr val="tx1"/>
+            </a:solidFill>
             <a:tailEnd type="triangle"/>
           </a:ln>
         </p:spPr>
@@ -9563,6 +9590,9 @@
             <a:avLst/>
           </a:prstGeom>
           <a:ln>
+            <a:solidFill>
+              <a:schemeClr val="tx1"/>
+            </a:solidFill>
             <a:tailEnd type="triangle"/>
           </a:ln>
         </p:spPr>

</xml_diff>